<commit_message>
Clear out timings and narration that might be in presentations.
</commit_message>
<xml_diff>
--- a/agile-redux.pptx
+++ b/agile-redux.pptx
@@ -293,7 +293,7 @@
               <a:rPr lang="en-US" smtClean="0">
                 <a:uFillTx/>
               </a:rPr>
-              <a:t>8/7/20</a:t>
+              <a:t>5/21/2021</a:t>
             </a:fld>
             <a:endParaRPr lang="en-US" dirty="0">
               <a:uFillTx/>
@@ -478,7 +478,7 @@
               <a:rPr lang="en-US" smtClean="0">
                 <a:uFillTx/>
               </a:rPr>
-              <a:t>8/7/20</a:t>
+              <a:t>5/21/2021</a:t>
             </a:fld>
             <a:endParaRPr lang="en-US" dirty="0">
               <a:uFillTx/>

</xml_diff>

<commit_message>
Agile-Redux update for ISC
</commit_message>
<xml_diff>
--- a/agile-redux.pptx
+++ b/agile-redux.pptx
@@ -267,7 +267,7 @@
           <a:p>
             <a:fld id="{0B842F42-2CE9-4E35-95C1-410DC08A50B1}" type="datetimeFigureOut">
               <a:rPr lang="en-US" smtClean="0"/>
-              <a:t>5/21/2021</a:t>
+              <a:t>6/15/21</a:t>
             </a:fld>
             <a:endParaRPr lang="en-US"/>
           </a:p>
@@ -432,7 +432,7 @@
           <a:p>
             <a:fld id="{6F282904-F315-4730-8D91-37D99E141A6F}" type="datetimeFigureOut">
               <a:rPr lang="en-US" smtClean="0"/>
-              <a:t>5/21/2021</a:t>
+              <a:t>6/15/21</a:t>
             </a:fld>
             <a:endParaRPr lang="en-US"/>
           </a:p>
@@ -4743,49 +4743,13 @@
           <a:p>
             <a:r>
               <a:rPr lang="en-US" dirty="0"/>
-              <a:t>David E. Bernholdt</a:t>
-            </a:r>
-            <a:br>
-              <a:rPr lang="en-US" dirty="0"/>
-            </a:br>
+              <a:t>Rinku Gupta</a:t>
+            </a:r>
+          </a:p>
+          <a:p>
             <a:r>
               <a:rPr lang="en-US" sz="2000" dirty="0"/>
-              <a:t>Oak Ridge National Laboratory</a:t>
-            </a:r>
-            <a:endParaRPr lang="en-US" dirty="0"/>
-          </a:p>
-          <a:p>
-            <a:pPr>
-              <a:spcBef>
-                <a:spcPts val="2400"/>
-              </a:spcBef>
-            </a:pPr>
-            <a:r>
-              <a:rPr lang="en-US" dirty="0"/>
-              <a:t>Michael A. </a:t>
-            </a:r>
-            <a:r>
-              <a:rPr lang="en-US" dirty="0" err="1"/>
-              <a:t>Heroux</a:t>
-            </a:r>
-            <a:r>
-              <a:rPr lang="en-US" dirty="0"/>
-              <a:t>, </a:t>
-            </a:r>
-            <a:r>
-              <a:rPr lang="en-US" u="sng" dirty="0"/>
-              <a:t>James M. </a:t>
-            </a:r>
-            <a:r>
-              <a:rPr lang="en-US" u="sng" dirty="0" err="1"/>
-              <a:t>Willenbring</a:t>
-            </a:r>
-            <a:br>
-              <a:rPr lang="en-US" dirty="0"/>
-            </a:br>
-            <a:r>
-              <a:rPr lang="en-US" sz="2000" dirty="0"/>
-              <a:t>Sandia National Laboratories</a:t>
+              <a:t>Argonne National Laboratories</a:t>
             </a:r>
             <a:br>
               <a:rPr lang="en-US" sz="2000" dirty="0"/>
@@ -4793,10 +4757,6 @@
             <a:br>
               <a:rPr lang="en-US" dirty="0"/>
             </a:br>
-            <a:r>
-              <a:rPr lang="en-US" sz="2000" dirty="0"/>
-              <a:t>Software Productivity Track, ATPESC 2020</a:t>
-            </a:r>
             <a:br>
               <a:rPr lang="en-US" sz="2000" dirty="0"/>
             </a:br>
@@ -4881,7 +4841,12 @@
             <p:ph idx="1"/>
           </p:nvPr>
         </p:nvSpPr>
-        <p:spPr/>
+        <p:spPr>
+          <a:xfrm>
+            <a:off x="365760" y="1325880"/>
+            <a:ext cx="11369809" cy="4047778"/>
+          </a:xfrm>
+        </p:spPr>
         <p:txBody>
           <a:bodyPr/>
           <a:lstStyle/>
@@ -5259,7 +5224,7 @@
         </p:nvSpPr>
         <p:spPr>
           <a:xfrm>
-            <a:off x="650875" y="3017838"/>
+            <a:off x="365760" y="2032186"/>
             <a:ext cx="11537950" cy="1490662"/>
           </a:xfrm>
         </p:spPr>
@@ -5352,7 +5317,7 @@
         </p:nvGrpSpPr>
         <p:grpSpPr>
           <a:xfrm>
-            <a:off x="365760" y="734223"/>
+            <a:off x="1342476" y="781725"/>
             <a:ext cx="9419039" cy="5238177"/>
             <a:chOff x="6447844" y="986418"/>
             <a:chExt cx="5291420" cy="4925788"/>
@@ -6354,15 +6319,15 @@
         </p:nvSpPr>
         <p:spPr>
           <a:xfrm>
-            <a:off x="-747895" y="123005"/>
-            <a:ext cx="11372473" cy="720197"/>
+            <a:off x="-1" y="123005"/>
+            <a:ext cx="12188825" cy="720197"/>
           </a:xfrm>
         </p:spPr>
         <p:txBody>
           <a:bodyPr/>
           <a:lstStyle/>
           <a:p>
-            <a:pPr algn="r"/>
+            <a:pPr algn="ctr"/>
             <a:r>
               <a:rPr lang="en-US" sz="2400" dirty="0"/>
               <a:t>Productivity and Sustainability Improvement Planning (PSIP) </a:t>
@@ -6395,7 +6360,7 @@
         </p:nvSpPr>
         <p:spPr>
           <a:xfrm>
-            <a:off x="603550" y="3622194"/>
+            <a:off x="603550" y="3693444"/>
             <a:ext cx="5315677" cy="2391015"/>
           </a:xfrm>
           <a:solidFill>
@@ -7072,7 +7037,7 @@
         </p:blipFill>
         <p:spPr>
           <a:xfrm>
-            <a:off x="553854" y="694117"/>
+            <a:off x="553854" y="777242"/>
             <a:ext cx="5126278" cy="2791616"/>
           </a:xfrm>
           <a:prstGeom prst="rect">
@@ -7094,7 +7059,7 @@
         </p:nvSpPr>
         <p:spPr>
           <a:xfrm>
-            <a:off x="731879" y="6037749"/>
+            <a:off x="731879" y="6108999"/>
             <a:ext cx="5059017" cy="840230"/>
           </a:xfrm>
           <a:prstGeom prst="rect">
@@ -7619,7 +7584,7 @@
         </p:nvSpPr>
         <p:spPr>
           <a:xfrm>
-            <a:off x="2693988" y="2743200"/>
+            <a:off x="365760" y="1325880"/>
             <a:ext cx="9494837" cy="1673225"/>
           </a:xfrm>
         </p:spPr>
@@ -7710,7 +7675,12 @@
             <p:ph idx="1"/>
           </p:nvPr>
         </p:nvSpPr>
-        <p:spPr/>
+        <p:spPr>
+          <a:xfrm>
+            <a:off x="365760" y="1096092"/>
+            <a:ext cx="11369809" cy="4047778"/>
+          </a:xfrm>
+        </p:spPr>
         <p:txBody>
           <a:bodyPr/>
           <a:lstStyle/>
@@ -7893,7 +7863,12 @@
             <p:ph idx="1"/>
           </p:nvPr>
         </p:nvSpPr>
-        <p:spPr/>
+        <p:spPr>
+          <a:xfrm>
+            <a:off x="365760" y="1238597"/>
+            <a:ext cx="11369809" cy="4047778"/>
+          </a:xfrm>
+        </p:spPr>
         <p:txBody>
           <a:bodyPr/>
           <a:lstStyle/>
@@ -7920,7 +7895,7 @@
             <a:pPr lvl="1"/>
             <a:r>
               <a:rPr lang="en-US" dirty="0"/>
-              <a:t>“Pre-established standards or requirements a product or project must meet.”       – Google</a:t>
+              <a:t>“Pre-established standards or requirements a product or project must meet.”  – Google</a:t>
             </a:r>
           </a:p>
           <a:p>
@@ -8006,7 +7981,12 @@
             <p:ph idx="1"/>
           </p:nvPr>
         </p:nvSpPr>
-        <p:spPr/>
+        <p:spPr>
+          <a:xfrm>
+            <a:off x="365760" y="1179220"/>
+            <a:ext cx="11369809" cy="4047778"/>
+          </a:xfrm>
+        </p:spPr>
         <p:txBody>
           <a:bodyPr/>
           <a:lstStyle/>
@@ -8111,7 +8091,12 @@
             <p:ph idx="1"/>
           </p:nvPr>
         </p:nvSpPr>
-        <p:spPr/>
+        <p:spPr>
+          <a:xfrm>
+            <a:off x="365760" y="1202971"/>
+            <a:ext cx="11369809" cy="4047778"/>
+          </a:xfrm>
+        </p:spPr>
         <p:txBody>
           <a:bodyPr/>
           <a:lstStyle/>
@@ -8254,7 +8239,12 @@
             <p:ph idx="1"/>
           </p:nvPr>
         </p:nvSpPr>
-        <p:spPr/>
+        <p:spPr>
+          <a:xfrm>
+            <a:off x="365760" y="1119843"/>
+            <a:ext cx="11369809" cy="4047778"/>
+          </a:xfrm>
+        </p:spPr>
         <p:txBody>
           <a:bodyPr/>
           <a:lstStyle/>
@@ -9278,12 +9268,9 @@
 </file>
 
 <file path=customXml/item1.xml><?xml version="1.0" encoding="utf-8"?>
-<?mso-contentType ?>
-<FormTemplates xmlns="http://schemas.microsoft.com/sharepoint/v3/contenttype/forms">
-  <Display>DocumentLibraryForm</Display>
-  <Edit>DocumentLibraryForm</Edit>
-  <New>DocumentLibraryForm</New>
-</FormTemplates>
+<p:properties xmlns:p="http://schemas.microsoft.com/office/2006/metadata/properties" xmlns:xsi="http://www.w3.org/2001/XMLSchema-instance" xmlns:pc="http://schemas.microsoft.com/office/infopath/2007/PartnerControls">
+  <documentManagement/>
+</p:properties>
 </file>
 
 <file path=customXml/item2.xml><?xml version="1.0" encoding="utf-8"?>
@@ -9336,15 +9323,25 @@
 </file>
 
 <file path=customXml/item3.xml><?xml version="1.0" encoding="utf-8"?>
-<p:properties xmlns:p="http://schemas.microsoft.com/office/2006/metadata/properties" xmlns:xsi="http://www.w3.org/2001/XMLSchema-instance" xmlns:pc="http://schemas.microsoft.com/office/infopath/2007/PartnerControls">
-  <documentManagement/>
-</p:properties>
+<?mso-contentType ?>
+<FormTemplates xmlns="http://schemas.microsoft.com/sharepoint/v3/contenttype/forms">
+  <Display>DocumentLibraryForm</Display>
+  <Edit>DocumentLibraryForm</Edit>
+  <New>DocumentLibraryForm</New>
+</FormTemplates>
 </file>
 
 <file path=customXml/itemProps1.xml><?xml version="1.0" encoding="utf-8"?>
-<ds:datastoreItem xmlns:ds="http://schemas.openxmlformats.org/officeDocument/2006/customXml" ds:itemID="{19E20559-B232-4371-8690-E3D8007EDB82}">
+<ds:datastoreItem xmlns:ds="http://schemas.openxmlformats.org/officeDocument/2006/customXml" ds:itemID="{A50EC660-24D0-43A0-AE5E-E274115E726B}">
   <ds:schemaRefs>
-    <ds:schemaRef ds:uri="http://schemas.microsoft.com/sharepoint/v3/contenttype/forms"/>
+    <ds:schemaRef ds:uri="http://purl.org/dc/elements/1.1/"/>
+    <ds:schemaRef ds:uri="http://schemas.microsoft.com/office/2006/metadata/properties"/>
+    <ds:schemaRef ds:uri="http://purl.org/dc/terms/"/>
+    <ds:schemaRef ds:uri="http://schemas.openxmlformats.org/package/2006/metadata/core-properties"/>
+    <ds:schemaRef ds:uri="http://schemas.microsoft.com/office/2006/documentManagement/types"/>
+    <ds:schemaRef ds:uri="http://www.w3.org/XML/1998/namespace"/>
+    <ds:schemaRef ds:uri="http://purl.org/dc/dcmitype/"/>
+    <ds:schemaRef ds:uri="http://schemas.microsoft.com/office/infopath/2007/PartnerControls"/>
   </ds:schemaRefs>
 </ds:datastoreItem>
 </file>
@@ -9365,16 +9362,9 @@
 </file>
 
 <file path=customXml/itemProps3.xml><?xml version="1.0" encoding="utf-8"?>
-<ds:datastoreItem xmlns:ds="http://schemas.openxmlformats.org/officeDocument/2006/customXml" ds:itemID="{A50EC660-24D0-43A0-AE5E-E274115E726B}">
+<ds:datastoreItem xmlns:ds="http://schemas.openxmlformats.org/officeDocument/2006/customXml" ds:itemID="{19E20559-B232-4371-8690-E3D8007EDB82}">
   <ds:schemaRefs>
-    <ds:schemaRef ds:uri="http://purl.org/dc/elements/1.1/"/>
-    <ds:schemaRef ds:uri="http://schemas.microsoft.com/office/2006/metadata/properties"/>
-    <ds:schemaRef ds:uri="http://purl.org/dc/terms/"/>
-    <ds:schemaRef ds:uri="http://schemas.openxmlformats.org/package/2006/metadata/core-properties"/>
-    <ds:schemaRef ds:uri="http://schemas.microsoft.com/office/2006/documentManagement/types"/>
-    <ds:schemaRef ds:uri="http://www.w3.org/XML/1998/namespace"/>
-    <ds:schemaRef ds:uri="http://purl.org/dc/dcmitype/"/>
-    <ds:schemaRef ds:uri="http://schemas.microsoft.com/office/infopath/2007/PartnerControls"/>
+    <ds:schemaRef ds:uri="http://schemas.microsoft.com/sharepoint/v3/contenttype/forms"/>
   </ds:schemaRefs>
 </ds:datastoreItem>
 </file>
</xml_diff>

<commit_message>
Update title and licensing slides. Rename testing2 to testing-advanced
</commit_message>
<xml_diff>
--- a/agile-redux.pptx
+++ b/agile-redux.pptx
@@ -12,7 +12,7 @@
   </p:handoutMasterIdLst>
   <p:sldIdLst>
     <p:sldId id="332" r:id="rId5"/>
-    <p:sldId id="320" r:id="rId6"/>
+    <p:sldId id="1828" r:id="rId6"/>
     <p:sldId id="289" r:id="rId7"/>
     <p:sldId id="329" r:id="rId8"/>
     <p:sldId id="271" r:id="rId9"/>
@@ -267,7 +267,7 @@
           <a:p>
             <a:fld id="{0B842F42-2CE9-4E35-95C1-410DC08A50B1}" type="datetimeFigureOut">
               <a:rPr lang="en-US" smtClean="0"/>
-              <a:t>6/15/21</a:t>
+              <a:t>6/15/2021</a:t>
             </a:fld>
             <a:endParaRPr lang="en-US"/>
           </a:p>
@@ -432,7 +432,7 @@
           <a:p>
             <a:fld id="{6F282904-F315-4730-8D91-37D99E141A6F}" type="datetimeFigureOut">
               <a:rPr lang="en-US" smtClean="0"/>
-              <a:t>6/15/21</a:t>
+              <a:t>6/15/2021</a:t>
             </a:fld>
             <a:endParaRPr lang="en-US"/>
           </a:p>
@@ -4742,25 +4742,47 @@
           <a:lstStyle/>
           <a:p>
             <a:r>
-              <a:rPr lang="en-US" dirty="0"/>
+              <a:rPr lang="en-US" u="sng" dirty="0"/>
               <a:t>Rinku Gupta</a:t>
             </a:r>
-          </a:p>
-          <a:p>
-            <a:r>
-              <a:rPr lang="en-US" sz="2000" dirty="0"/>
-              <a:t>Argonne National Laboratories</a:t>
-            </a:r>
-            <a:br>
-              <a:rPr lang="en-US" sz="2000" dirty="0"/>
-            </a:br>
             <a:br>
               <a:rPr lang="en-US" dirty="0"/>
             </a:br>
-            <a:br>
+            <a:r>
               <a:rPr lang="en-US" sz="2000" dirty="0"/>
-            </a:br>
-            <a:endParaRPr lang="en-US" sz="2000" dirty="0"/>
+              <a:t>Argonne National Laboratory</a:t>
+            </a:r>
+            <a:endParaRPr lang="en-US" dirty="0"/>
+          </a:p>
+          <a:p>
+            <a:pPr>
+              <a:spcBef>
+                <a:spcPts val="2800"/>
+              </a:spcBef>
+            </a:pPr>
+            <a:r>
+              <a:rPr lang="en-US" sz="2000" dirty="0"/>
+              <a:t>Better Scientific Software Tutorial, ISC, June 2021</a:t>
+            </a:r>
+          </a:p>
+          <a:p>
+            <a:pPr>
+              <a:spcBef>
+                <a:spcPts val="2800"/>
+              </a:spcBef>
+            </a:pPr>
+            <a:r>
+              <a:rPr lang="en-US" sz="2000" dirty="0"/>
+              <a:t>Contributors: Rinku K. Gupta (ANL), Michael A. Heroux (SNL), James M. </a:t>
+            </a:r>
+            <a:r>
+              <a:rPr lang="en-US" sz="2000" dirty="0" err="1"/>
+              <a:t>Willenbring</a:t>
+            </a:r>
+            <a:r>
+              <a:rPr lang="en-US" sz="2000" dirty="0"/>
+              <a:t> (SNL)</a:t>
+            </a:r>
           </a:p>
           <a:p>
             <a:endParaRPr lang="en-US" sz="2000" dirty="0"/>
@@ -7144,7 +7166,12 @@
             <p:ph type="title"/>
           </p:nvPr>
         </p:nvSpPr>
-        <p:spPr/>
+        <p:spPr>
+          <a:xfrm>
+            <a:off x="363096" y="112911"/>
+            <a:ext cx="11372473" cy="914400"/>
+          </a:xfrm>
+        </p:spPr>
         <p:txBody>
           <a:bodyPr/>
           <a:lstStyle/>
@@ -7174,7 +7201,7 @@
         </p:nvSpPr>
         <p:spPr>
           <a:xfrm>
-            <a:off x="365760" y="862719"/>
+            <a:off x="409507" y="570111"/>
             <a:ext cx="11369809" cy="4047778"/>
           </a:xfrm>
         </p:spPr>
@@ -7225,21 +7252,13 @@
             </a:pPr>
             <a:r>
               <a:rPr lang="en-US" sz="1600" b="1" dirty="0"/>
-              <a:t>The requested citation the overall tutorial is: David E. Bernholdt, Anshu Dubey, Mark C. Miller, Katherine M. Riley, and James M. </a:t>
-            </a:r>
-            <a:r>
-              <a:rPr lang="en-US" sz="1600" b="1" dirty="0" err="1"/>
-              <a:t>Willenbring</a:t>
-            </a:r>
-            <a:r>
-              <a:rPr lang="en-US" sz="1600" b="1" dirty="0"/>
-              <a:t>, Software Productivity Track, in Argonne Training Program for Extreme Scale Computing (ATPESC), online. DOI: </a:t>
+              <a:t>The requested citation the overall tutorial is: David E. Bernholdt, Anshu Dubey, Patricia A. Grubel, Rinku K. Gupta, and David M. Rogers, Better Scientific Software tutorial, in ISC High Performance, online, 2021. DOI: </a:t>
             </a:r>
             <a:r>
               <a:rPr lang="en-US" sz="1600" b="1" dirty="0">
                 <a:hlinkClick r:id="rId4"/>
               </a:rPr>
-              <a:t>10.6084/m9.figshare.12719834</a:t>
+              <a:t>10.6084/m9.figshare.14642520</a:t>
             </a:r>
             <a:endParaRPr lang="en-US" sz="1600" b="1" dirty="0"/>
           </a:p>
@@ -7259,11 +7278,14 @@
             </a:r>
             <a:r>
               <a:rPr lang="en-US" sz="1600" dirty="0"/>
-              <a:t>, in Software Productivity Track…</a:t>
+              <a:t>, in Better Scientific Software tutorial…</a:t>
             </a:r>
           </a:p>
           <a:p>
             <a:pPr marL="0" indent="0">
+              <a:spcBef>
+                <a:spcPts val="800"/>
+              </a:spcBef>
               <a:buNone/>
             </a:pPr>
             <a:r>
@@ -7278,25 +7300,22 @@
               </a:spcBef>
             </a:pPr>
             <a:r>
-              <a:rPr lang="en-US" sz="1600" dirty="0"/>
-              <a:t>Additional contributors include: Patricia Grubel, Rinku Gupta, Mike </a:t>
-            </a:r>
-            <a:r>
-              <a:rPr lang="en-US" sz="1600" dirty="0" err="1"/>
-              <a:t>Heroux</a:t>
-            </a:r>
-            <a:r>
-              <a:rPr lang="en-US" sz="1600" dirty="0"/>
-              <a:t>, Alicia </a:t>
-            </a:r>
-            <a:r>
-              <a:rPr lang="en-US" sz="1600" dirty="0" err="1"/>
-              <a:t>Klinvex</a:t>
-            </a:r>
-            <a:r>
-              <a:rPr lang="en-US" sz="1600" dirty="0"/>
-              <a:t>, Jared O’Neal, David Rogers</a:t>
-            </a:r>
+              <a:rPr lang="en-US" sz="1400" dirty="0"/>
+              <a:t>This work was supported by the U.S. Department of Energy Office of Science, Office of Advanced Scientific Computing Research (ASCR), and by the </a:t>
+            </a:r>
+            <a:r>
+              <a:rPr lang="en-US" sz="1400" dirty="0" err="1"/>
+              <a:t>Exascale</a:t>
+            </a:r>
+            <a:r>
+              <a:rPr lang="en-US" sz="1400" dirty="0"/>
+              <a:t> Computing Project (17-SC-20-SC), a collaborative effort of the U.S. Department of Energy Office of Science and the National Nuclear Security Administration</a:t>
+            </a:r>
+            <a:r>
+              <a:rPr lang="en-US" sz="1400" i="1" dirty="0"/>
+              <a:t>.</a:t>
+            </a:r>
+            <a:endParaRPr lang="en-US" sz="1400" dirty="0"/>
           </a:p>
           <a:p>
             <a:pPr>
@@ -7305,22 +7324,17 @@
               </a:spcBef>
             </a:pPr>
             <a:r>
-              <a:rPr lang="en-US" sz="1600" dirty="0"/>
-              <a:t>This work was supported by the U.S. Department of Energy Office of Science, Office of Advanced Scientific Computing Research (ASCR), and by the </a:t>
-            </a:r>
-            <a:r>
-              <a:rPr lang="en-US" sz="1600" dirty="0" err="1"/>
-              <a:t>Exascale</a:t>
-            </a:r>
-            <a:r>
-              <a:rPr lang="en-US" sz="1600" dirty="0"/>
-              <a:t> Computing Project (17-SC-20-SC), a collaborative effort of the U.S. Department of Energy Office of Science and the National Nuclear Security Administration</a:t>
-            </a:r>
-            <a:r>
-              <a:rPr lang="en-US" sz="1600" i="1" dirty="0"/>
-              <a:t>.</a:t>
-            </a:r>
-            <a:endParaRPr lang="en-US" sz="1600" dirty="0"/>
+              <a:rPr lang="en-US" sz="1400" dirty="0"/>
+              <a:t>This work was performed in part at the Argonne National Laboratory, which is managed by </a:t>
+            </a:r>
+            <a:r>
+              <a:rPr lang="en-US" sz="1400" dirty="0" err="1"/>
+              <a:t>UChicago</a:t>
+            </a:r>
+            <a:r>
+              <a:rPr lang="en-US" sz="1400" dirty="0"/>
+              <a:t> Argonne, LLC for the U.S. Department of Energy under Contract No. DE-AC02-06CH11357.</a:t>
+            </a:r>
           </a:p>
           <a:p>
             <a:pPr>
@@ -7329,16 +7343,8 @@
               </a:spcBef>
             </a:pPr>
             <a:r>
-              <a:rPr lang="en-US" sz="1600" dirty="0"/>
-              <a:t>This work was performed in part at the Argonne National Laboratory, which is managed by </a:t>
-            </a:r>
-            <a:r>
-              <a:rPr lang="en-US" sz="1600" dirty="0" err="1"/>
-              <a:t>UChicago</a:t>
-            </a:r>
-            <a:r>
-              <a:rPr lang="en-US" sz="1600" dirty="0"/>
-              <a:t> Argonne, LLC for the U.S. Department of Energy under Contract No. DE-AC02-06CH11357.</a:t>
+              <a:rPr lang="en-US" sz="1400" dirty="0"/>
+              <a:t>This work was performed in part at the Oak Ridge National Laboratory, which is managed by UT-Battelle, LLC for the U.S. Department of Energy under Contract No. DE-AC05-00OR22725.</a:t>
             </a:r>
           </a:p>
           <a:p>
@@ -7348,8 +7354,8 @@
               </a:spcBef>
             </a:pPr>
             <a:r>
-              <a:rPr lang="en-US" sz="1600" dirty="0"/>
-              <a:t>This work was performed in part at the Oak Ridge National Laboratory, which is managed by UT-Battelle, LLC for the U.S. Department of Energy under Contract No. DE-AC05-00OR22725.</a:t>
+              <a:rPr lang="en-US" sz="1400" dirty="0"/>
+              <a:t>This work was performed in part at the Lawrence Livermore National Laboratory, which is managed by Lawrence Livermore National Security, LLC for the U.S. Department of Energy under Contract No. DE-AC52-07NA27344.</a:t>
             </a:r>
           </a:p>
           <a:p>
@@ -7359,8 +7365,8 @@
               </a:spcBef>
             </a:pPr>
             <a:r>
-              <a:rPr lang="en-US" sz="1600" dirty="0"/>
-              <a:t>This work was performed in part at the Lawrence Livermore National Laboratory, which is managed by Lawrence Livermore National Security, LLC for the U.S. Department of Energy under Contract No. DE-AC52-07NA27344.</a:t>
+              <a:rPr lang="en-US" sz="1400" dirty="0"/>
+              <a:t>This work was performed in part at the Los Alamos National Laboratory, which is managed by Triad National Security, LLC for the U.S. Department of Energy under Contract No.89233218CNA000001</a:t>
             </a:r>
           </a:p>
           <a:p>
@@ -7370,8 +7376,8 @@
               </a:spcBef>
             </a:pPr>
             <a:r>
-              <a:rPr lang="en-US" sz="1600" dirty="0"/>
-              <a:t>This work was performed in part at Sandia National Laboratories. Sandia National Laboratories is a multi-mission laboratory managed and operated by National Technology and Engineering Solutions of Sandia, LLC., a wholly owned subsidiary of Honeywell International, Inc., for the U.S. Department of Energy’s National Nuclear Security Administration under contract DE-NA0003525. SAND NO SAND2020-7957 PE</a:t>
+              <a:rPr lang="en-US" sz="1400" dirty="0"/>
+              <a:t>This work was performed in part at Sandia National Laboratories. Sandia National Laboratories is a multi-mission laboratory managed and operated by National Technology and Engineering Solutions of Sandia, LLC., a wholly owned subsidiary of Honeywell International, Inc., for the U.S. Department of Energy’s National Nuclear Security Administration under contract DE-NA0003525.</a:t>
             </a:r>
           </a:p>
         </p:txBody>
@@ -7405,8 +7411,8 @@
         </p:blipFill>
         <p:spPr bwMode="auto">
           <a:xfrm>
-            <a:off x="10249254" y="570111"/>
-            <a:ext cx="1661258" cy="585216"/>
+            <a:off x="10230336" y="879673"/>
+            <a:ext cx="838200" cy="295275"/>
           </a:xfrm>
           <a:prstGeom prst="rect">
             <a:avLst/>
@@ -7426,7 +7432,7 @@
     </p:spTree>
     <p:extLst>
       <p:ext uri="{BB962C8B-B14F-4D97-AF65-F5344CB8AC3E}">
-        <p14:creationId xmlns:p14="http://schemas.microsoft.com/office/powerpoint/2010/main" val="3126013647"/>
+        <p14:creationId xmlns:p14="http://schemas.microsoft.com/office/powerpoint/2010/main" val="978726433"/>
       </p:ext>
     </p:extLst>
   </p:cSld>
@@ -9274,6 +9280,15 @@
 </file>
 
 <file path=customXml/item2.xml><?xml version="1.0" encoding="utf-8"?>
+<?mso-contentType ?>
+<FormTemplates xmlns="http://schemas.microsoft.com/sharepoint/v3/contenttype/forms">
+  <Display>DocumentLibraryForm</Display>
+  <Edit>DocumentLibraryForm</Edit>
+  <New>DocumentLibraryForm</New>
+</FormTemplates>
+</file>
+
+<file path=customXml/item3.xml><?xml version="1.0" encoding="utf-8"?>
 <ct:contentTypeSchema xmlns:ct="http://schemas.microsoft.com/office/2006/metadata/contentType" xmlns:ma="http://schemas.microsoft.com/office/2006/metadata/properties/metaAttributes" ct:_="" ma:_="" ma:contentTypeName="Document" ma:contentTypeID="0x010100565464437F680748A68B85EB6594EA7D" ma:contentTypeVersion="0" ma:contentTypeDescription="Create a new document." ma:contentTypeScope="" ma:versionID="fe3f4dd58d5914c51cfc6deaa8ad845c">
   <xsd:schema xmlns:xsd="http://www.w3.org/2001/XMLSchema" xmlns:p="http://schemas.microsoft.com/office/2006/metadata/properties" targetNamespace="http://schemas.microsoft.com/office/2006/metadata/properties" ma:root="true" ma:fieldsID="4aeb20c0e3442673af7ee10786458764">
     <xsd:element name="properties">
@@ -9322,15 +9337,6 @@
 </ct:contentTypeSchema>
 </file>
 
-<file path=customXml/item3.xml><?xml version="1.0" encoding="utf-8"?>
-<?mso-contentType ?>
-<FormTemplates xmlns="http://schemas.microsoft.com/sharepoint/v3/contenttype/forms">
-  <Display>DocumentLibraryForm</Display>
-  <Edit>DocumentLibraryForm</Edit>
-  <New>DocumentLibraryForm</New>
-</FormTemplates>
-</file>
-
 <file path=customXml/itemProps1.xml><?xml version="1.0" encoding="utf-8"?>
 <ds:datastoreItem xmlns:ds="http://schemas.openxmlformats.org/officeDocument/2006/customXml" ds:itemID="{A50EC660-24D0-43A0-AE5E-E274115E726B}">
   <ds:schemaRefs>
@@ -9347,6 +9353,14 @@
 </file>
 
 <file path=customXml/itemProps2.xml><?xml version="1.0" encoding="utf-8"?>
+<ds:datastoreItem xmlns:ds="http://schemas.openxmlformats.org/officeDocument/2006/customXml" ds:itemID="{19E20559-B232-4371-8690-E3D8007EDB82}">
+  <ds:schemaRefs>
+    <ds:schemaRef ds:uri="http://schemas.microsoft.com/sharepoint/v3/contenttype/forms"/>
+  </ds:schemaRefs>
+</ds:datastoreItem>
+</file>
+
+<file path=customXml/itemProps3.xml><?xml version="1.0" encoding="utf-8"?>
 <ds:datastoreItem xmlns:ds="http://schemas.openxmlformats.org/officeDocument/2006/customXml" ds:itemID="{E8DB7DEB-074E-4EE8-9B6E-FD277323109C}">
   <ds:schemaRefs>
     <ds:schemaRef ds:uri="http://schemas.microsoft.com/office/2006/metadata/contentType"/>
@@ -9359,12 +9373,4 @@
     <ds:schemaRef ds:uri="http://schemas.microsoft.com/office/internal/2005/internalDocumentation"/>
   </ds:schemaRefs>
 </ds:datastoreItem>
-</file>
-
-<file path=customXml/itemProps3.xml><?xml version="1.0" encoding="utf-8"?>
-<ds:datastoreItem xmlns:ds="http://schemas.openxmlformats.org/officeDocument/2006/customXml" ds:itemID="{19E20559-B232-4371-8690-E3D8007EDB82}">
-  <ds:schemaRefs>
-    <ds:schemaRef ds:uri="http://schemas.microsoft.com/sharepoint/v3/contenttype/forms"/>
-  </ds:schemaRefs>
-</ds:datastoreItem>
 </file>
</xml_diff>

<commit_message>
Updated agile, agile-redux and git workflows
</commit_message>
<xml_diff>
--- a/agile-redux.pptx
+++ b/agile-redux.pptx
@@ -267,7 +267,7 @@
           <a:p>
             <a:fld id="{0B842F42-2CE9-4E35-95C1-410DC08A50B1}" type="datetimeFigureOut">
               <a:rPr lang="en-US" smtClean="0"/>
-              <a:t>6/15/2021</a:t>
+              <a:t>8/10/21</a:t>
             </a:fld>
             <a:endParaRPr lang="en-US"/>
           </a:p>
@@ -432,7 +432,7 @@
           <a:p>
             <a:fld id="{6F282904-F315-4730-8D91-37D99E141A6F}" type="datetimeFigureOut">
               <a:rPr lang="en-US" smtClean="0"/>
-              <a:t>6/15/2021</a:t>
+              <a:t>8/10/21</a:t>
             </a:fld>
             <a:endParaRPr lang="en-US"/>
           </a:p>
@@ -4752,7 +4752,6 @@
               <a:rPr lang="en-US" sz="2000" dirty="0"/>
               <a:t>Argonne National Laboratory</a:t>
             </a:r>
-            <a:endParaRPr lang="en-US" dirty="0"/>
           </a:p>
           <a:p>
             <a:pPr>
@@ -4762,7 +4761,7 @@
             </a:pPr>
             <a:r>
               <a:rPr lang="en-US" sz="2000" dirty="0"/>
-              <a:t>Better Scientific Software Tutorial, ISC, June 2021</a:t>
+              <a:t>Software Productivity and Sustainability track, ATPESC 2021</a:t>
             </a:r>
           </a:p>
           <a:p>
@@ -9274,21 +9273,6 @@
 </file>
 
 <file path=customXml/item1.xml><?xml version="1.0" encoding="utf-8"?>
-<p:properties xmlns:p="http://schemas.microsoft.com/office/2006/metadata/properties" xmlns:xsi="http://www.w3.org/2001/XMLSchema-instance" xmlns:pc="http://schemas.microsoft.com/office/infopath/2007/PartnerControls">
-  <documentManagement/>
-</p:properties>
-</file>
-
-<file path=customXml/item2.xml><?xml version="1.0" encoding="utf-8"?>
-<?mso-contentType ?>
-<FormTemplates xmlns="http://schemas.microsoft.com/sharepoint/v3/contenttype/forms">
-  <Display>DocumentLibraryForm</Display>
-  <Edit>DocumentLibraryForm</Edit>
-  <New>DocumentLibraryForm</New>
-</FormTemplates>
-</file>
-
-<file path=customXml/item3.xml><?xml version="1.0" encoding="utf-8"?>
 <ct:contentTypeSchema xmlns:ct="http://schemas.microsoft.com/office/2006/metadata/contentType" xmlns:ma="http://schemas.microsoft.com/office/2006/metadata/properties/metaAttributes" ct:_="" ma:_="" ma:contentTypeName="Document" ma:contentTypeID="0x010100565464437F680748A68B85EB6594EA7D" ma:contentTypeVersion="0" ma:contentTypeDescription="Create a new document." ma:contentTypeScope="" ma:versionID="fe3f4dd58d5914c51cfc6deaa8ad845c">
   <xsd:schema xmlns:xsd="http://www.w3.org/2001/XMLSchema" xmlns:p="http://schemas.microsoft.com/office/2006/metadata/properties" targetNamespace="http://schemas.microsoft.com/office/2006/metadata/properties" ma:root="true" ma:fieldsID="4aeb20c0e3442673af7ee10786458764">
     <xsd:element name="properties">
@@ -9337,17 +9321,32 @@
 </ct:contentTypeSchema>
 </file>
 
+<file path=customXml/item2.xml><?xml version="1.0" encoding="utf-8"?>
+<?mso-contentType ?>
+<FormTemplates xmlns="http://schemas.microsoft.com/sharepoint/v3/contenttype/forms">
+  <Display>DocumentLibraryForm</Display>
+  <Edit>DocumentLibraryForm</Edit>
+  <New>DocumentLibraryForm</New>
+</FormTemplates>
+</file>
+
+<file path=customXml/item3.xml><?xml version="1.0" encoding="utf-8"?>
+<p:properties xmlns:p="http://schemas.microsoft.com/office/2006/metadata/properties" xmlns:xsi="http://www.w3.org/2001/XMLSchema-instance" xmlns:pc="http://schemas.microsoft.com/office/infopath/2007/PartnerControls">
+  <documentManagement/>
+</p:properties>
+</file>
+
 <file path=customXml/itemProps1.xml><?xml version="1.0" encoding="utf-8"?>
-<ds:datastoreItem xmlns:ds="http://schemas.openxmlformats.org/officeDocument/2006/customXml" ds:itemID="{A50EC660-24D0-43A0-AE5E-E274115E726B}">
+<ds:datastoreItem xmlns:ds="http://schemas.openxmlformats.org/officeDocument/2006/customXml" ds:itemID="{E8DB7DEB-074E-4EE8-9B6E-FD277323109C}">
   <ds:schemaRefs>
+    <ds:schemaRef ds:uri="http://schemas.microsoft.com/office/2006/metadata/contentType"/>
+    <ds:schemaRef ds:uri="http://schemas.microsoft.com/office/2006/metadata/properties/metaAttributes"/>
+    <ds:schemaRef ds:uri="http://www.w3.org/2001/XMLSchema"/>
+    <ds:schemaRef ds:uri="http://schemas.microsoft.com/office/2006/metadata/properties"/>
+    <ds:schemaRef ds:uri="http://schemas.openxmlformats.org/package/2006/metadata/core-properties"/>
     <ds:schemaRef ds:uri="http://purl.org/dc/elements/1.1/"/>
-    <ds:schemaRef ds:uri="http://schemas.microsoft.com/office/2006/metadata/properties"/>
     <ds:schemaRef ds:uri="http://purl.org/dc/terms/"/>
-    <ds:schemaRef ds:uri="http://schemas.openxmlformats.org/package/2006/metadata/core-properties"/>
-    <ds:schemaRef ds:uri="http://schemas.microsoft.com/office/2006/documentManagement/types"/>
-    <ds:schemaRef ds:uri="http://www.w3.org/XML/1998/namespace"/>
-    <ds:schemaRef ds:uri="http://purl.org/dc/dcmitype/"/>
-    <ds:schemaRef ds:uri="http://schemas.microsoft.com/office/infopath/2007/PartnerControls"/>
+    <ds:schemaRef ds:uri="http://schemas.microsoft.com/office/internal/2005/internalDocumentation"/>
   </ds:schemaRefs>
 </ds:datastoreItem>
 </file>
@@ -9361,16 +9360,16 @@
 </file>
 
 <file path=customXml/itemProps3.xml><?xml version="1.0" encoding="utf-8"?>
-<ds:datastoreItem xmlns:ds="http://schemas.openxmlformats.org/officeDocument/2006/customXml" ds:itemID="{E8DB7DEB-074E-4EE8-9B6E-FD277323109C}">
+<ds:datastoreItem xmlns:ds="http://schemas.openxmlformats.org/officeDocument/2006/customXml" ds:itemID="{A50EC660-24D0-43A0-AE5E-E274115E726B}">
   <ds:schemaRefs>
-    <ds:schemaRef ds:uri="http://schemas.microsoft.com/office/2006/metadata/contentType"/>
-    <ds:schemaRef ds:uri="http://schemas.microsoft.com/office/2006/metadata/properties/metaAttributes"/>
-    <ds:schemaRef ds:uri="http://www.w3.org/2001/XMLSchema"/>
+    <ds:schemaRef ds:uri="http://purl.org/dc/elements/1.1/"/>
     <ds:schemaRef ds:uri="http://schemas.microsoft.com/office/2006/metadata/properties"/>
+    <ds:schemaRef ds:uri="http://purl.org/dc/terms/"/>
     <ds:schemaRef ds:uri="http://schemas.openxmlformats.org/package/2006/metadata/core-properties"/>
-    <ds:schemaRef ds:uri="http://purl.org/dc/elements/1.1/"/>
-    <ds:schemaRef ds:uri="http://purl.org/dc/terms/"/>
-    <ds:schemaRef ds:uri="http://schemas.microsoft.com/office/internal/2005/internalDocumentation"/>
+    <ds:schemaRef ds:uri="http://schemas.microsoft.com/office/2006/documentManagement/types"/>
+    <ds:schemaRef ds:uri="http://www.w3.org/XML/1998/namespace"/>
+    <ds:schemaRef ds:uri="http://purl.org/dc/dcmitype/"/>
+    <ds:schemaRef ds:uri="http://schemas.microsoft.com/office/infopath/2007/PartnerControls"/>
   </ds:schemaRefs>
 </ds:datastoreItem>
 </file>
</xml_diff>

<commit_message>
Change PSIP link on slide 13 to short version
Resolves #58
</commit_message>
<xml_diff>
--- a/agile-redux.pptx
+++ b/agile-redux.pptx
@@ -267,7 +267,7 @@
           <a:p>
             <a:fld id="{0B842F42-2CE9-4E35-95C1-410DC08A50B1}" type="datetimeFigureOut">
               <a:rPr lang="en-US" smtClean="0"/>
-              <a:t>8/10/21</a:t>
+              <a:t>8/10/2021</a:t>
             </a:fld>
             <a:endParaRPr lang="en-US"/>
           </a:p>
@@ -432,7 +432,7 @@
           <a:p>
             <a:fld id="{6F282904-F315-4730-8D91-37D99E141A6F}" type="datetimeFigureOut">
               <a:rPr lang="en-US" smtClean="0"/>
-              <a:t>8/10/21</a:t>
+              <a:t>8/10/2021</a:t>
             </a:fld>
             <a:endParaRPr lang="en-US"/>
           </a:p>
@@ -7080,8 +7080,8 @@
         </p:nvSpPr>
         <p:spPr>
           <a:xfrm>
-            <a:off x="731879" y="6108999"/>
-            <a:ext cx="5059017" cy="840230"/>
+            <a:off x="731879" y="6285569"/>
+            <a:ext cx="5059017" cy="341632"/>
           </a:xfrm>
           <a:prstGeom prst="rect">
             <a:avLst/>
@@ -7103,19 +7103,9 @@
               <a:rPr lang="en-US" dirty="0">
                 <a:hlinkClick r:id="rId6"/>
               </a:rPr>
-              <a:t>https://bssw.io/blog_posts/productivity-and-sustainability-improvement-planning-psip</a:t>
+              <a:t>https://bssw.io/psip</a:t>
             </a:r>
             <a:endParaRPr lang="en-US" dirty="0"/>
-          </a:p>
-          <a:p>
-            <a:pPr algn="ctr">
-              <a:lnSpc>
-                <a:spcPct val="90000"/>
-              </a:lnSpc>
-            </a:pPr>
-            <a:endParaRPr lang="en-US" dirty="0">
-              <a:uFillTx/>
-            </a:endParaRPr>
           </a:p>
         </p:txBody>
       </p:sp>
@@ -9273,6 +9263,21 @@
 </file>
 
 <file path=customXml/item1.xml><?xml version="1.0" encoding="utf-8"?>
+<p:properties xmlns:p="http://schemas.microsoft.com/office/2006/metadata/properties" xmlns:xsi="http://www.w3.org/2001/XMLSchema-instance" xmlns:pc="http://schemas.microsoft.com/office/infopath/2007/PartnerControls">
+  <documentManagement/>
+</p:properties>
+</file>
+
+<file path=customXml/item2.xml><?xml version="1.0" encoding="utf-8"?>
+<?mso-contentType ?>
+<FormTemplates xmlns="http://schemas.microsoft.com/sharepoint/v3/contenttype/forms">
+  <Display>DocumentLibraryForm</Display>
+  <Edit>DocumentLibraryForm</Edit>
+  <New>DocumentLibraryForm</New>
+</FormTemplates>
+</file>
+
+<file path=customXml/item3.xml><?xml version="1.0" encoding="utf-8"?>
 <ct:contentTypeSchema xmlns:ct="http://schemas.microsoft.com/office/2006/metadata/contentType" xmlns:ma="http://schemas.microsoft.com/office/2006/metadata/properties/metaAttributes" ct:_="" ma:_="" ma:contentTypeName="Document" ma:contentTypeID="0x010100565464437F680748A68B85EB6594EA7D" ma:contentTypeVersion="0" ma:contentTypeDescription="Create a new document." ma:contentTypeScope="" ma:versionID="fe3f4dd58d5914c51cfc6deaa8ad845c">
   <xsd:schema xmlns:xsd="http://www.w3.org/2001/XMLSchema" xmlns:p="http://schemas.microsoft.com/office/2006/metadata/properties" targetNamespace="http://schemas.microsoft.com/office/2006/metadata/properties" ma:root="true" ma:fieldsID="4aeb20c0e3442673af7ee10786458764">
     <xsd:element name="properties">
@@ -9321,32 +9326,17 @@
 </ct:contentTypeSchema>
 </file>
 
-<file path=customXml/item2.xml><?xml version="1.0" encoding="utf-8"?>
-<?mso-contentType ?>
-<FormTemplates xmlns="http://schemas.microsoft.com/sharepoint/v3/contenttype/forms">
-  <Display>DocumentLibraryForm</Display>
-  <Edit>DocumentLibraryForm</Edit>
-  <New>DocumentLibraryForm</New>
-</FormTemplates>
-</file>
-
-<file path=customXml/item3.xml><?xml version="1.0" encoding="utf-8"?>
-<p:properties xmlns:p="http://schemas.microsoft.com/office/2006/metadata/properties" xmlns:xsi="http://www.w3.org/2001/XMLSchema-instance" xmlns:pc="http://schemas.microsoft.com/office/infopath/2007/PartnerControls">
-  <documentManagement/>
-</p:properties>
-</file>
-
 <file path=customXml/itemProps1.xml><?xml version="1.0" encoding="utf-8"?>
-<ds:datastoreItem xmlns:ds="http://schemas.openxmlformats.org/officeDocument/2006/customXml" ds:itemID="{E8DB7DEB-074E-4EE8-9B6E-FD277323109C}">
+<ds:datastoreItem xmlns:ds="http://schemas.openxmlformats.org/officeDocument/2006/customXml" ds:itemID="{A50EC660-24D0-43A0-AE5E-E274115E726B}">
   <ds:schemaRefs>
-    <ds:schemaRef ds:uri="http://schemas.microsoft.com/office/2006/metadata/contentType"/>
-    <ds:schemaRef ds:uri="http://schemas.microsoft.com/office/2006/metadata/properties/metaAttributes"/>
-    <ds:schemaRef ds:uri="http://www.w3.org/2001/XMLSchema"/>
+    <ds:schemaRef ds:uri="http://purl.org/dc/elements/1.1/"/>
     <ds:schemaRef ds:uri="http://schemas.microsoft.com/office/2006/metadata/properties"/>
+    <ds:schemaRef ds:uri="http://purl.org/dc/terms/"/>
     <ds:schemaRef ds:uri="http://schemas.openxmlformats.org/package/2006/metadata/core-properties"/>
-    <ds:schemaRef ds:uri="http://purl.org/dc/elements/1.1/"/>
-    <ds:schemaRef ds:uri="http://purl.org/dc/terms/"/>
-    <ds:schemaRef ds:uri="http://schemas.microsoft.com/office/internal/2005/internalDocumentation"/>
+    <ds:schemaRef ds:uri="http://schemas.microsoft.com/office/2006/documentManagement/types"/>
+    <ds:schemaRef ds:uri="http://www.w3.org/XML/1998/namespace"/>
+    <ds:schemaRef ds:uri="http://purl.org/dc/dcmitype/"/>
+    <ds:schemaRef ds:uri="http://schemas.microsoft.com/office/infopath/2007/PartnerControls"/>
   </ds:schemaRefs>
 </ds:datastoreItem>
 </file>
@@ -9360,16 +9350,16 @@
 </file>
 
 <file path=customXml/itemProps3.xml><?xml version="1.0" encoding="utf-8"?>
-<ds:datastoreItem xmlns:ds="http://schemas.openxmlformats.org/officeDocument/2006/customXml" ds:itemID="{A50EC660-24D0-43A0-AE5E-E274115E726B}">
+<ds:datastoreItem xmlns:ds="http://schemas.openxmlformats.org/officeDocument/2006/customXml" ds:itemID="{E8DB7DEB-074E-4EE8-9B6E-FD277323109C}">
   <ds:schemaRefs>
+    <ds:schemaRef ds:uri="http://schemas.microsoft.com/office/2006/metadata/contentType"/>
+    <ds:schemaRef ds:uri="http://schemas.microsoft.com/office/2006/metadata/properties/metaAttributes"/>
+    <ds:schemaRef ds:uri="http://www.w3.org/2001/XMLSchema"/>
+    <ds:schemaRef ds:uri="http://schemas.microsoft.com/office/2006/metadata/properties"/>
+    <ds:schemaRef ds:uri="http://schemas.openxmlformats.org/package/2006/metadata/core-properties"/>
     <ds:schemaRef ds:uri="http://purl.org/dc/elements/1.1/"/>
-    <ds:schemaRef ds:uri="http://schemas.microsoft.com/office/2006/metadata/properties"/>
     <ds:schemaRef ds:uri="http://purl.org/dc/terms/"/>
-    <ds:schemaRef ds:uri="http://schemas.openxmlformats.org/package/2006/metadata/core-properties"/>
-    <ds:schemaRef ds:uri="http://schemas.microsoft.com/office/2006/documentManagement/types"/>
-    <ds:schemaRef ds:uri="http://www.w3.org/XML/1998/namespace"/>
-    <ds:schemaRef ds:uri="http://purl.org/dc/dcmitype/"/>
-    <ds:schemaRef ds:uri="http://schemas.microsoft.com/office/infopath/2007/PartnerControls"/>
+    <ds:schemaRef ds:uri="http://schemas.microsoft.com/office/internal/2005/internalDocumentation"/>
   </ds:schemaRefs>
 </ds:datastoreItem>
 </file>
</xml_diff>

<commit_message>
Update title and licensing slides for ATPESC
</commit_message>
<xml_diff>
--- a/agile-redux.pptx
+++ b/agile-redux.pptx
@@ -12,7 +12,7 @@
   </p:handoutMasterIdLst>
   <p:sldIdLst>
     <p:sldId id="332" r:id="rId5"/>
-    <p:sldId id="1828" r:id="rId6"/>
+    <p:sldId id="320" r:id="rId6"/>
     <p:sldId id="289" r:id="rId7"/>
     <p:sldId id="329" r:id="rId8"/>
     <p:sldId id="271" r:id="rId9"/>
@@ -7241,13 +7241,13 @@
             </a:pPr>
             <a:r>
               <a:rPr lang="en-US" sz="1600" b="1" dirty="0"/>
-              <a:t>The requested citation the overall tutorial is: David E. Bernholdt, Anshu Dubey, Patricia A. Grubel, Rinku K. Gupta, and David M. Rogers, Better Scientific Software tutorial, in ISC High Performance, online, 2021. DOI: </a:t>
+              <a:t>The requested citation the overall tutorial is: David E. Bernholdt, Anshu Dubey, Rinku K. Gupta, and David M. Rogers, Software Productivity and Sustainability track, in Argonne Training Program on Extreme-Scale Computing (ATPESC), online, 2021. DOI: </a:t>
             </a:r>
             <a:r>
               <a:rPr lang="en-US" sz="1600" b="1" dirty="0">
                 <a:hlinkClick r:id="rId4"/>
               </a:rPr>
-              <a:t>10.6084/m9.figshare.14642520</a:t>
+              <a:t>10.6084/m9.figshare.15130590</a:t>
             </a:r>
             <a:endParaRPr lang="en-US" sz="1600" b="1" dirty="0"/>
           </a:p>
@@ -9263,21 +9263,6 @@
 </file>
 
 <file path=customXml/item1.xml><?xml version="1.0" encoding="utf-8"?>
-<p:properties xmlns:p="http://schemas.microsoft.com/office/2006/metadata/properties" xmlns:xsi="http://www.w3.org/2001/XMLSchema-instance" xmlns:pc="http://schemas.microsoft.com/office/infopath/2007/PartnerControls">
-  <documentManagement/>
-</p:properties>
-</file>
-
-<file path=customXml/item2.xml><?xml version="1.0" encoding="utf-8"?>
-<?mso-contentType ?>
-<FormTemplates xmlns="http://schemas.microsoft.com/sharepoint/v3/contenttype/forms">
-  <Display>DocumentLibraryForm</Display>
-  <Edit>DocumentLibraryForm</Edit>
-  <New>DocumentLibraryForm</New>
-</FormTemplates>
-</file>
-
-<file path=customXml/item3.xml><?xml version="1.0" encoding="utf-8"?>
 <ct:contentTypeSchema xmlns:ct="http://schemas.microsoft.com/office/2006/metadata/contentType" xmlns:ma="http://schemas.microsoft.com/office/2006/metadata/properties/metaAttributes" ct:_="" ma:_="" ma:contentTypeName="Document" ma:contentTypeID="0x010100565464437F680748A68B85EB6594EA7D" ma:contentTypeVersion="0" ma:contentTypeDescription="Create a new document." ma:contentTypeScope="" ma:versionID="fe3f4dd58d5914c51cfc6deaa8ad845c">
   <xsd:schema xmlns:xsd="http://www.w3.org/2001/XMLSchema" xmlns:p="http://schemas.microsoft.com/office/2006/metadata/properties" targetNamespace="http://schemas.microsoft.com/office/2006/metadata/properties" ma:root="true" ma:fieldsID="4aeb20c0e3442673af7ee10786458764">
     <xsd:element name="properties">
@@ -9326,17 +9311,32 @@
 </ct:contentTypeSchema>
 </file>
 
+<file path=customXml/item2.xml><?xml version="1.0" encoding="utf-8"?>
+<?mso-contentType ?>
+<FormTemplates xmlns="http://schemas.microsoft.com/sharepoint/v3/contenttype/forms">
+  <Display>DocumentLibraryForm</Display>
+  <Edit>DocumentLibraryForm</Edit>
+  <New>DocumentLibraryForm</New>
+</FormTemplates>
+</file>
+
+<file path=customXml/item3.xml><?xml version="1.0" encoding="utf-8"?>
+<p:properties xmlns:p="http://schemas.microsoft.com/office/2006/metadata/properties" xmlns:xsi="http://www.w3.org/2001/XMLSchema-instance" xmlns:pc="http://schemas.microsoft.com/office/infopath/2007/PartnerControls">
+  <documentManagement/>
+</p:properties>
+</file>
+
 <file path=customXml/itemProps1.xml><?xml version="1.0" encoding="utf-8"?>
-<ds:datastoreItem xmlns:ds="http://schemas.openxmlformats.org/officeDocument/2006/customXml" ds:itemID="{A50EC660-24D0-43A0-AE5E-E274115E726B}">
+<ds:datastoreItem xmlns:ds="http://schemas.openxmlformats.org/officeDocument/2006/customXml" ds:itemID="{E8DB7DEB-074E-4EE8-9B6E-FD277323109C}">
   <ds:schemaRefs>
+    <ds:schemaRef ds:uri="http://schemas.microsoft.com/office/2006/metadata/contentType"/>
+    <ds:schemaRef ds:uri="http://schemas.microsoft.com/office/2006/metadata/properties/metaAttributes"/>
+    <ds:schemaRef ds:uri="http://www.w3.org/2001/XMLSchema"/>
+    <ds:schemaRef ds:uri="http://schemas.microsoft.com/office/2006/metadata/properties"/>
+    <ds:schemaRef ds:uri="http://schemas.openxmlformats.org/package/2006/metadata/core-properties"/>
     <ds:schemaRef ds:uri="http://purl.org/dc/elements/1.1/"/>
-    <ds:schemaRef ds:uri="http://schemas.microsoft.com/office/2006/metadata/properties"/>
     <ds:schemaRef ds:uri="http://purl.org/dc/terms/"/>
-    <ds:schemaRef ds:uri="http://schemas.openxmlformats.org/package/2006/metadata/core-properties"/>
-    <ds:schemaRef ds:uri="http://schemas.microsoft.com/office/2006/documentManagement/types"/>
-    <ds:schemaRef ds:uri="http://www.w3.org/XML/1998/namespace"/>
-    <ds:schemaRef ds:uri="http://purl.org/dc/dcmitype/"/>
-    <ds:schemaRef ds:uri="http://schemas.microsoft.com/office/infopath/2007/PartnerControls"/>
+    <ds:schemaRef ds:uri="http://schemas.microsoft.com/office/internal/2005/internalDocumentation"/>
   </ds:schemaRefs>
 </ds:datastoreItem>
 </file>
@@ -9350,16 +9350,16 @@
 </file>
 
 <file path=customXml/itemProps3.xml><?xml version="1.0" encoding="utf-8"?>
-<ds:datastoreItem xmlns:ds="http://schemas.openxmlformats.org/officeDocument/2006/customXml" ds:itemID="{E8DB7DEB-074E-4EE8-9B6E-FD277323109C}">
+<ds:datastoreItem xmlns:ds="http://schemas.openxmlformats.org/officeDocument/2006/customXml" ds:itemID="{A50EC660-24D0-43A0-AE5E-E274115E726B}">
   <ds:schemaRefs>
-    <ds:schemaRef ds:uri="http://schemas.microsoft.com/office/2006/metadata/contentType"/>
-    <ds:schemaRef ds:uri="http://schemas.microsoft.com/office/2006/metadata/properties/metaAttributes"/>
-    <ds:schemaRef ds:uri="http://www.w3.org/2001/XMLSchema"/>
+    <ds:schemaRef ds:uri="http://purl.org/dc/elements/1.1/"/>
     <ds:schemaRef ds:uri="http://schemas.microsoft.com/office/2006/metadata/properties"/>
+    <ds:schemaRef ds:uri="http://purl.org/dc/terms/"/>
     <ds:schemaRef ds:uri="http://schemas.openxmlformats.org/package/2006/metadata/core-properties"/>
-    <ds:schemaRef ds:uri="http://purl.org/dc/elements/1.1/"/>
-    <ds:schemaRef ds:uri="http://purl.org/dc/terms/"/>
-    <ds:schemaRef ds:uri="http://schemas.microsoft.com/office/internal/2005/internalDocumentation"/>
+    <ds:schemaRef ds:uri="http://schemas.microsoft.com/office/2006/documentManagement/types"/>
+    <ds:schemaRef ds:uri="http://www.w3.org/XML/1998/namespace"/>
+    <ds:schemaRef ds:uri="http://purl.org/dc/dcmitype/"/>
+    <ds:schemaRef ds:uri="http://schemas.microsoft.com/office/infopath/2007/PartnerControls"/>
   </ds:schemaRefs>
 </ds:datastoreItem>
 </file>
</xml_diff>

<commit_message>
Add some more PSIP resource pointers
Add links to RateYourProject.org and to the PSIP Progress Tracking Card catalog.  Tried to fit them in so presenters don't need to spend time on them, but put them in the talks so they're more in front of participants.
</commit_message>
<xml_diff>
--- a/agile-redux.pptx
+++ b/agile-redux.pptx
@@ -267,7 +267,7 @@
           <a:p>
             <a:fld id="{0B842F42-2CE9-4E35-95C1-410DC08A50B1}" type="datetimeFigureOut">
               <a:rPr lang="en-US" smtClean="0"/>
-              <a:t>9/1/2021</a:t>
+              <a:t>10/3/2021</a:t>
             </a:fld>
             <a:endParaRPr lang="en-US"/>
           </a:p>
@@ -432,7 +432,7 @@
           <a:p>
             <a:fld id="{6F282904-F315-4730-8D91-37D99E141A6F}" type="datetimeFigureOut">
               <a:rPr lang="en-US" smtClean="0"/>
-              <a:t>9/1/2021</a:t>
+              <a:t>10/3/2021</a:t>
             </a:fld>
             <a:endParaRPr lang="en-US"/>
           </a:p>
@@ -6308,6 +6308,71 @@
           </p:grpSp>
         </p:grpSp>
       </p:grpSp>
+      <p:sp>
+        <p:nvSpPr>
+          <p:cNvPr id="25" name="TextBox 24">
+            <a:extLst>
+              <a:ext uri="{FF2B5EF4-FFF2-40B4-BE49-F238E27FC236}">
+                <a16:creationId xmlns:a16="http://schemas.microsoft.com/office/drawing/2014/main" id="{CE54068E-F508-49B7-9A7D-E4CBAFC6604C}"/>
+              </a:ext>
+            </a:extLst>
+          </p:cNvPr>
+          <p:cNvSpPr txBox="1"/>
+          <p:nvPr/>
+        </p:nvSpPr>
+        <p:spPr>
+          <a:xfrm>
+            <a:off x="8601665" y="1459734"/>
+            <a:ext cx="3269819" cy="840230"/>
+          </a:xfrm>
+          <a:prstGeom prst="rect">
+            <a:avLst/>
+          </a:prstGeom>
+          <a:solidFill>
+            <a:schemeClr val="bg1"/>
+          </a:solidFill>
+          <a:ln>
+            <a:solidFill>
+              <a:schemeClr val="tx2"/>
+            </a:solidFill>
+          </a:ln>
+          <a:effectLst>
+            <a:outerShdw blurRad="50800" dist="38100" dir="2700000" algn="tl" rotWithShape="0">
+              <a:prstClr val="black">
+                <a:alpha val="40000"/>
+              </a:prstClr>
+            </a:outerShdw>
+          </a:effectLst>
+        </p:spPr>
+        <p:txBody>
+          <a:bodyPr wrap="square" rtlCol="0">
+            <a:spAutoFit/>
+          </a:bodyPr>
+          <a:lstStyle/>
+          <a:p>
+            <a:pPr algn="ctr">
+              <a:lnSpc>
+                <a:spcPct val="90000"/>
+              </a:lnSpc>
+            </a:pPr>
+            <a:r>
+              <a:rPr lang="en-US" i="1" dirty="0">
+                <a:solidFill>
+                  <a:schemeClr val="tx2"/>
+                </a:solidFill>
+              </a:rPr>
+              <a:t>Productivity and Sustainability Improvement Planning (PSIP): </a:t>
+            </a:r>
+            <a:r>
+              <a:rPr lang="en-US" i="1" dirty="0">
+                <a:hlinkClick r:id="rId2"/>
+              </a:rPr>
+              <a:t>https://bssw.io/psip</a:t>
+            </a:r>
+            <a:endParaRPr lang="en-US" i="1" dirty="0"/>
+          </a:p>
+        </p:txBody>
+      </p:sp>
     </p:spTree>
     <p:extLst>
       <p:ext uri="{BB962C8B-B14F-4D97-AF65-F5344CB8AC3E}">
@@ -7096,8 +7161,8 @@
         </p:nvSpPr>
         <p:spPr>
           <a:xfrm>
-            <a:off x="731879" y="6285569"/>
-            <a:ext cx="5059017" cy="341632"/>
+            <a:off x="603550" y="6207602"/>
+            <a:ext cx="7012143" cy="638123"/>
           </a:xfrm>
           <a:prstGeom prst="rect">
             <a:avLst/>
@@ -7110,18 +7175,62 @@
           </a:bodyPr>
           <a:lstStyle/>
           <a:p>
-            <a:pPr algn="ctr">
+            <a:pPr>
               <a:lnSpc>
                 <a:spcPct val="90000"/>
               </a:lnSpc>
+              <a:spcBef>
+                <a:spcPts val="800"/>
+              </a:spcBef>
             </a:pPr>
             <a:r>
-              <a:rPr lang="en-US" dirty="0">
+              <a:rPr lang="en-US" sz="1600" dirty="0" err="1">
+                <a:solidFill>
+                  <a:schemeClr val="tx2"/>
+                </a:solidFill>
+              </a:rPr>
+              <a:t>RateYourProject</a:t>
+            </a:r>
+            <a:r>
+              <a:rPr lang="en-US" sz="1600" dirty="0">
+                <a:solidFill>
+                  <a:schemeClr val="tx2"/>
+                </a:solidFill>
+              </a:rPr>
+              <a:t> assessment tool: </a:t>
+            </a:r>
+            <a:r>
+              <a:rPr lang="en-US" sz="1600" dirty="0">
                 <a:hlinkClick r:id="rId6"/>
               </a:rPr>
-              <a:t>https://bssw.io/psip</a:t>
-            </a:r>
-            <a:endParaRPr lang="en-US" dirty="0"/>
+              <a:t>https://rateyourproject.org/</a:t>
+            </a:r>
+            <a:endParaRPr lang="en-US" sz="1600" dirty="0"/>
+          </a:p>
+          <a:p>
+            <a:pPr>
+              <a:lnSpc>
+                <a:spcPct val="90000"/>
+              </a:lnSpc>
+              <a:spcBef>
+                <a:spcPts val="800"/>
+              </a:spcBef>
+            </a:pPr>
+            <a:r>
+              <a:rPr lang="en-US" sz="1600" dirty="0">
+                <a:solidFill>
+                  <a:schemeClr val="tx2"/>
+                </a:solidFill>
+              </a:rPr>
+              <a:t>More tracking card examples: </a:t>
+            </a:r>
+            <a:r>
+              <a:rPr lang="en-US" sz="1600" dirty="0">
+                <a:hlinkClick r:id="rId7"/>
+              </a:rPr>
+              <a:t>https://bssw-psip.github.io/ptc-catalog/catalog</a:t>
+            </a:r>
+            <a:endParaRPr lang="en-US" sz="1600" dirty="0"/>
           </a:p>
         </p:txBody>
       </p:sp>
@@ -9279,12 +9388,9 @@
 </file>
 
 <file path=customXml/item1.xml><?xml version="1.0" encoding="utf-8"?>
-<?mso-contentType ?>
-<FormTemplates xmlns="http://schemas.microsoft.com/sharepoint/v3/contenttype/forms">
-  <Display>DocumentLibraryForm</Display>
-  <Edit>DocumentLibraryForm</Edit>
-  <New>DocumentLibraryForm</New>
-</FormTemplates>
+<p:properties xmlns:p="http://schemas.microsoft.com/office/2006/metadata/properties" xmlns:xsi="http://www.w3.org/2001/XMLSchema-instance" xmlns:pc="http://schemas.microsoft.com/office/infopath/2007/PartnerControls">
+  <documentManagement/>
+</p:properties>
 </file>
 
 <file path=customXml/item2.xml><?xml version="1.0" encoding="utf-8"?>
@@ -9337,15 +9443,25 @@
 </file>
 
 <file path=customXml/item3.xml><?xml version="1.0" encoding="utf-8"?>
-<p:properties xmlns:p="http://schemas.microsoft.com/office/2006/metadata/properties" xmlns:xsi="http://www.w3.org/2001/XMLSchema-instance" xmlns:pc="http://schemas.microsoft.com/office/infopath/2007/PartnerControls">
-  <documentManagement/>
-</p:properties>
+<?mso-contentType ?>
+<FormTemplates xmlns="http://schemas.microsoft.com/sharepoint/v3/contenttype/forms">
+  <Display>DocumentLibraryForm</Display>
+  <Edit>DocumentLibraryForm</Edit>
+  <New>DocumentLibraryForm</New>
+</FormTemplates>
 </file>
 
 <file path=customXml/itemProps1.xml><?xml version="1.0" encoding="utf-8"?>
-<ds:datastoreItem xmlns:ds="http://schemas.openxmlformats.org/officeDocument/2006/customXml" ds:itemID="{19E20559-B232-4371-8690-E3D8007EDB82}">
+<ds:datastoreItem xmlns:ds="http://schemas.openxmlformats.org/officeDocument/2006/customXml" ds:itemID="{A50EC660-24D0-43A0-AE5E-E274115E726B}">
   <ds:schemaRefs>
-    <ds:schemaRef ds:uri="http://schemas.microsoft.com/sharepoint/v3/contenttype/forms"/>
+    <ds:schemaRef ds:uri="http://purl.org/dc/elements/1.1/"/>
+    <ds:schemaRef ds:uri="http://schemas.microsoft.com/office/2006/metadata/properties"/>
+    <ds:schemaRef ds:uri="http://purl.org/dc/terms/"/>
+    <ds:schemaRef ds:uri="http://schemas.openxmlformats.org/package/2006/metadata/core-properties"/>
+    <ds:schemaRef ds:uri="http://schemas.microsoft.com/office/2006/documentManagement/types"/>
+    <ds:schemaRef ds:uri="http://www.w3.org/XML/1998/namespace"/>
+    <ds:schemaRef ds:uri="http://purl.org/dc/dcmitype/"/>
+    <ds:schemaRef ds:uri="http://schemas.microsoft.com/office/infopath/2007/PartnerControls"/>
   </ds:schemaRefs>
 </ds:datastoreItem>
 </file>
@@ -9366,16 +9482,9 @@
 </file>
 
 <file path=customXml/itemProps3.xml><?xml version="1.0" encoding="utf-8"?>
-<ds:datastoreItem xmlns:ds="http://schemas.openxmlformats.org/officeDocument/2006/customXml" ds:itemID="{A50EC660-24D0-43A0-AE5E-E274115E726B}">
+<ds:datastoreItem xmlns:ds="http://schemas.openxmlformats.org/officeDocument/2006/customXml" ds:itemID="{19E20559-B232-4371-8690-E3D8007EDB82}">
   <ds:schemaRefs>
-    <ds:schemaRef ds:uri="http://purl.org/dc/elements/1.1/"/>
-    <ds:schemaRef ds:uri="http://schemas.microsoft.com/office/2006/metadata/properties"/>
-    <ds:schemaRef ds:uri="http://purl.org/dc/terms/"/>
-    <ds:schemaRef ds:uri="http://schemas.openxmlformats.org/package/2006/metadata/core-properties"/>
-    <ds:schemaRef ds:uri="http://schemas.microsoft.com/office/2006/documentManagement/types"/>
-    <ds:schemaRef ds:uri="http://www.w3.org/XML/1998/namespace"/>
-    <ds:schemaRef ds:uri="http://purl.org/dc/dcmitype/"/>
-    <ds:schemaRef ds:uri="http://schemas.microsoft.com/office/infopath/2007/PartnerControls"/>
+    <ds:schemaRef ds:uri="http://schemas.microsoft.com/sharepoint/v3/contenttype/forms"/>
   </ds:schemaRefs>
 </ds:datastoreItem>
 </file>
</xml_diff>